<commit_message>
Added Example for Uploading to Wecode
</commit_message>
<xml_diff>
--- a/Wecode_GotTalent/Hao/TaiLieuTrain/cacloithidau.pptx
+++ b/Wecode_GotTalent/Hao/TaiLieuTrain/cacloithidau.pptx
@@ -13,6 +13,8 @@
     <p:sldId id="261" r:id="rId7"/>
     <p:sldId id="263" r:id="rId8"/>
     <p:sldId id="264" r:id="rId9"/>
+    <p:sldId id="265" r:id="rId10"/>
+    <p:sldId id="266" r:id="rId11"/>
   </p:sldIdLst>
   <p:sldSz cx="9144000" cy="6858000" type="screen4x3"/>
   <p:notesSz cx="6858000" cy="9144000"/>
@@ -111,6 +113,22 @@
       </a:defRPr>
     </a:lvl9pPr>
   </p:defaultTextStyle>
+  <p:extLst>
+    <p:ext uri="{EFAFB233-063F-42B5-8137-9DF3F51BA10A}">
+      <p15:sldGuideLst xmlns:p15="http://schemas.microsoft.com/office/powerpoint/2012/main">
+        <p15:guide id="1" orient="horz" pos="2160">
+          <p15:clr>
+            <a:srgbClr val="A4A3A4"/>
+          </p15:clr>
+        </p15:guide>
+        <p15:guide id="2" pos="2880">
+          <p15:clr>
+            <a:srgbClr val="A4A3A4"/>
+          </p15:clr>
+        </p15:guide>
+      </p15:sldGuideLst>
+    </p:ext>
+  </p:extLst>
 </p:presentation>
 </file>
 
@@ -295,7 +313,7 @@
           <a:p>
             <a:fld id="{DB509DBA-25D1-451F-BC23-B2027E48F30C}" type="datetimeFigureOut">
               <a:rPr lang="en-US" smtClean="0"/>
-              <a:t>11/26/2018</a:t>
+              <a:t>03/12/2018</a:t>
             </a:fld>
             <a:endParaRPr lang="en-US"/>
           </a:p>
@@ -465,7 +483,7 @@
           <a:p>
             <a:fld id="{DB509DBA-25D1-451F-BC23-B2027E48F30C}" type="datetimeFigureOut">
               <a:rPr lang="en-US" smtClean="0"/>
-              <a:t>11/26/2018</a:t>
+              <a:t>03/12/2018</a:t>
             </a:fld>
             <a:endParaRPr lang="en-US"/>
           </a:p>
@@ -645,7 +663,7 @@
           <a:p>
             <a:fld id="{DB509DBA-25D1-451F-BC23-B2027E48F30C}" type="datetimeFigureOut">
               <a:rPr lang="en-US" smtClean="0"/>
-              <a:t>11/26/2018</a:t>
+              <a:t>03/12/2018</a:t>
             </a:fld>
             <a:endParaRPr lang="en-US"/>
           </a:p>
@@ -815,7 +833,7 @@
           <a:p>
             <a:fld id="{DB509DBA-25D1-451F-BC23-B2027E48F30C}" type="datetimeFigureOut">
               <a:rPr lang="en-US" smtClean="0"/>
-              <a:t>11/26/2018</a:t>
+              <a:t>03/12/2018</a:t>
             </a:fld>
             <a:endParaRPr lang="en-US"/>
           </a:p>
@@ -1061,7 +1079,7 @@
           <a:p>
             <a:fld id="{DB509DBA-25D1-451F-BC23-B2027E48F30C}" type="datetimeFigureOut">
               <a:rPr lang="en-US" smtClean="0"/>
-              <a:t>11/26/2018</a:t>
+              <a:t>03/12/2018</a:t>
             </a:fld>
             <a:endParaRPr lang="en-US"/>
           </a:p>
@@ -1349,7 +1367,7 @@
           <a:p>
             <a:fld id="{DB509DBA-25D1-451F-BC23-B2027E48F30C}" type="datetimeFigureOut">
               <a:rPr lang="en-US" smtClean="0"/>
-              <a:t>11/26/2018</a:t>
+              <a:t>03/12/2018</a:t>
             </a:fld>
             <a:endParaRPr lang="en-US"/>
           </a:p>
@@ -1771,7 +1789,7 @@
           <a:p>
             <a:fld id="{DB509DBA-25D1-451F-BC23-B2027E48F30C}" type="datetimeFigureOut">
               <a:rPr lang="en-US" smtClean="0"/>
-              <a:t>11/26/2018</a:t>
+              <a:t>03/12/2018</a:t>
             </a:fld>
             <a:endParaRPr lang="en-US"/>
           </a:p>
@@ -1889,7 +1907,7 @@
           <a:p>
             <a:fld id="{DB509DBA-25D1-451F-BC23-B2027E48F30C}" type="datetimeFigureOut">
               <a:rPr lang="en-US" smtClean="0"/>
-              <a:t>11/26/2018</a:t>
+              <a:t>03/12/2018</a:t>
             </a:fld>
             <a:endParaRPr lang="en-US"/>
           </a:p>
@@ -1984,7 +2002,7 @@
           <a:p>
             <a:fld id="{DB509DBA-25D1-451F-BC23-B2027E48F30C}" type="datetimeFigureOut">
               <a:rPr lang="en-US" smtClean="0"/>
-              <a:t>11/26/2018</a:t>
+              <a:t>03/12/2018</a:t>
             </a:fld>
             <a:endParaRPr lang="en-US"/>
           </a:p>
@@ -2261,7 +2279,7 @@
           <a:p>
             <a:fld id="{DB509DBA-25D1-451F-BC23-B2027E48F30C}" type="datetimeFigureOut">
               <a:rPr lang="en-US" smtClean="0"/>
-              <a:t>11/26/2018</a:t>
+              <a:t>03/12/2018</a:t>
             </a:fld>
             <a:endParaRPr lang="en-US"/>
           </a:p>
@@ -2514,7 +2532,7 @@
           <a:p>
             <a:fld id="{DB509DBA-25D1-451F-BC23-B2027E48F30C}" type="datetimeFigureOut">
               <a:rPr lang="en-US" smtClean="0"/>
-              <a:t>11/26/2018</a:t>
+              <a:t>03/12/2018</a:t>
             </a:fld>
             <a:endParaRPr lang="en-US"/>
           </a:p>
@@ -2736,7 +2754,7 @@
           <a:p>
             <a:fld id="{DB509DBA-25D1-451F-BC23-B2027E48F30C}" type="datetimeFigureOut">
               <a:rPr lang="en-US" smtClean="0"/>
-              <a:t>11/26/2018</a:t>
+              <a:t>03/12/2018</a:t>
             </a:fld>
             <a:endParaRPr lang="en-US"/>
           </a:p>
@@ -3149,12 +3167,60 @@
           <a:p>
             <a:pPr algn="ctr"/>
             <a:r>
+              <a:rPr lang="en-US" sz="5400" b="1" dirty="0" err="1" smtClean="0">
+                <a:solidFill>
+                  <a:srgbClr val="FF0000"/>
+                </a:solidFill>
+              </a:rPr>
+              <a:t>Giới</a:t>
+            </a:r>
+            <a:r>
               <a:rPr lang="en-US" sz="5400" b="1" dirty="0" smtClean="0">
                 <a:solidFill>
                   <a:srgbClr val="FF0000"/>
                 </a:solidFill>
               </a:rPr>
-              <a:t>CÁC LỖI CƠ BẢN</a:t>
+              <a:t> </a:t>
+            </a:r>
+            <a:r>
+              <a:rPr lang="en-US" sz="5400" b="1" dirty="0" err="1" smtClean="0">
+                <a:solidFill>
+                  <a:srgbClr val="FF0000"/>
+                </a:solidFill>
+              </a:rPr>
+              <a:t>thiệu</a:t>
+            </a:r>
+            <a:r>
+              <a:rPr lang="en-US" sz="5400" b="1" dirty="0" smtClean="0">
+                <a:solidFill>
+                  <a:srgbClr val="FF0000"/>
+                </a:solidFill>
+              </a:rPr>
+              <a:t> </a:t>
+            </a:r>
+            <a:r>
+              <a:rPr lang="en-US" sz="5400" b="1" dirty="0" err="1" smtClean="0">
+                <a:solidFill>
+                  <a:srgbClr val="FF0000"/>
+                </a:solidFill>
+              </a:rPr>
+              <a:t>sơ</a:t>
+            </a:r>
+            <a:r>
+              <a:rPr lang="en-US" sz="5400" b="1" dirty="0" smtClean="0">
+                <a:solidFill>
+                  <a:srgbClr val="FF0000"/>
+                </a:solidFill>
+              </a:rPr>
+              <a:t> </a:t>
+            </a:r>
+            <a:r>
+              <a:rPr lang="en-US" sz="5400" b="1" dirty="0" err="1" smtClean="0">
+                <a:solidFill>
+                  <a:srgbClr val="FF0000"/>
+                </a:solidFill>
+              </a:rPr>
+              <a:t>bộ</a:t>
             </a:r>
             <a:endParaRPr lang="en-US" sz="5400" b="1" dirty="0">
               <a:solidFill>
@@ -3174,18 +3240,522 @@
   <p:clrMapOvr>
     <a:masterClrMapping/>
   </p:clrMapOvr>
-  <mc:AlternateContent xmlns:mc="http://schemas.openxmlformats.org/markup-compatibility/2006">
-    <mc:Choice xmlns:p14="http://schemas.microsoft.com/office/powerpoint/2010/main" Requires="p14">
+  <mc:AlternateContent xmlns:mc="http://schemas.openxmlformats.org/markup-compatibility/2006" xmlns:p14="http://schemas.microsoft.com/office/powerpoint/2010/main">
+    <mc:Choice Requires="p14">
       <p:transition spd="slow" p14:dur="1500">
         <p:split orient="vert"/>
       </p:transition>
     </mc:Choice>
-    <mc:Fallback>
+    <mc:Fallback xmlns="">
       <p:transition spd="slow">
         <p:split orient="vert"/>
       </p:transition>
     </mc:Fallback>
   </mc:AlternateContent>
+  <p:timing>
+    <p:tnLst>
+      <p:par>
+        <p:cTn id="1" dur="indefinite" restart="never" nodeType="tmRoot"/>
+      </p:par>
+    </p:tnLst>
+  </p:timing>
+</p:sld>
+</file>
+
+<file path=ppt/slides/slide10.xml><?xml version="1.0" encoding="utf-8"?>
+<p:sld xmlns:a="http://schemas.openxmlformats.org/drawingml/2006/main" xmlns:r="http://schemas.openxmlformats.org/officeDocument/2006/relationships" xmlns:p="http://schemas.openxmlformats.org/presentationml/2006/main">
+  <p:cSld>
+    <p:spTree>
+      <p:nvGrpSpPr>
+        <p:cNvPr id="1" name=""/>
+        <p:cNvGrpSpPr/>
+        <p:nvPr/>
+      </p:nvGrpSpPr>
+      <p:grpSpPr>
+        <a:xfrm>
+          <a:off x="0" y="0"/>
+          <a:ext cx="0" cy="0"/>
+          <a:chOff x="0" y="0"/>
+          <a:chExt cx="0" cy="0"/>
+        </a:xfrm>
+      </p:grpSpPr>
+      <p:sp>
+        <p:nvSpPr>
+          <p:cNvPr id="4" name="TextBox 3"/>
+          <p:cNvSpPr txBox="1"/>
+          <p:nvPr/>
+        </p:nvSpPr>
+        <p:spPr>
+          <a:xfrm>
+            <a:off x="1447800" y="914400"/>
+            <a:ext cx="6934200" cy="2862322"/>
+          </a:xfrm>
+          <a:prstGeom prst="rect">
+            <a:avLst/>
+          </a:prstGeom>
+          <a:noFill/>
+        </p:spPr>
+        <p:txBody>
+          <a:bodyPr wrap="square" rtlCol="0">
+            <a:spAutoFit/>
+          </a:bodyPr>
+          <a:lstStyle/>
+          <a:p>
+            <a:r>
+              <a:rPr lang="en-US" dirty="0">
+                <a:solidFill>
+                  <a:srgbClr val="FF0000"/>
+                </a:solidFill>
+              </a:rPr>
+              <a:t>long </a:t>
+            </a:r>
+            <a:r>
+              <a:rPr lang="en-US" dirty="0" err="1">
+                <a:solidFill>
+                  <a:srgbClr val="FF0000"/>
+                </a:solidFill>
+              </a:rPr>
+              <a:t>long</a:t>
+            </a:r>
+            <a:r>
+              <a:rPr lang="en-US" dirty="0">
+                <a:solidFill>
+                  <a:srgbClr val="FF0000"/>
+                </a:solidFill>
+              </a:rPr>
+              <a:t> </a:t>
+            </a:r>
+            <a:r>
+              <a:rPr lang="en-US" dirty="0"/>
+              <a:t>Sum(</a:t>
+            </a:r>
+            <a:r>
+              <a:rPr lang="en-US" dirty="0" err="1"/>
+              <a:t>int</a:t>
+            </a:r>
+            <a:r>
+              <a:rPr lang="en-US" dirty="0"/>
+              <a:t> n</a:t>
+            </a:r>
+            <a:r>
+              <a:rPr lang="en-US" dirty="0" smtClean="0"/>
+              <a:t>){</a:t>
+            </a:r>
+          </a:p>
+          <a:p>
+            <a:r>
+              <a:rPr lang="en-US" dirty="0"/>
+              <a:t>	return </a:t>
+            </a:r>
+            <a:r>
+              <a:rPr lang="en-US" dirty="0">
+                <a:solidFill>
+                  <a:srgbClr val="FF0000"/>
+                </a:solidFill>
+              </a:rPr>
+              <a:t>1LL</a:t>
+            </a:r>
+            <a:r>
+              <a:rPr lang="en-US" dirty="0"/>
+              <a:t>*n*(n+1)/2;</a:t>
+            </a:r>
+          </a:p>
+          <a:p>
+            <a:r>
+              <a:rPr lang="en-US" dirty="0"/>
+              <a:t>}</a:t>
+            </a:r>
+          </a:p>
+          <a:p>
+            <a:r>
+              <a:rPr lang="en-US" dirty="0" smtClean="0"/>
+              <a:t/>
+            </a:r>
+            <a:br>
+              <a:rPr lang="en-US" dirty="0" smtClean="0"/>
+            </a:br>
+            <a:r>
+              <a:rPr lang="en-US" dirty="0" smtClean="0"/>
+              <a:t>1LL </a:t>
+            </a:r>
+            <a:r>
+              <a:rPr lang="en-US" dirty="0" err="1" smtClean="0"/>
+              <a:t>là</a:t>
+            </a:r>
+            <a:r>
+              <a:rPr lang="en-US" dirty="0" smtClean="0"/>
+              <a:t> </a:t>
+            </a:r>
+            <a:r>
+              <a:rPr lang="en-US" dirty="0" err="1" smtClean="0"/>
+              <a:t>một</a:t>
+            </a:r>
+            <a:r>
+              <a:rPr lang="en-US" dirty="0" smtClean="0"/>
+              <a:t> </a:t>
+            </a:r>
+            <a:r>
+              <a:rPr lang="en-US" dirty="0" err="1" smtClean="0"/>
+              <a:t>cách</a:t>
+            </a:r>
+            <a:r>
+              <a:rPr lang="en-US" dirty="0" smtClean="0"/>
+              <a:t> </a:t>
+            </a:r>
+            <a:r>
+              <a:rPr lang="en-US" dirty="0" err="1" smtClean="0"/>
+              <a:t>ép</a:t>
+            </a:r>
+            <a:r>
+              <a:rPr lang="en-US" dirty="0" smtClean="0"/>
+              <a:t> </a:t>
+            </a:r>
+            <a:r>
+              <a:rPr lang="en-US" dirty="0" err="1" smtClean="0"/>
+              <a:t>kiểu</a:t>
+            </a:r>
+            <a:r>
+              <a:rPr lang="en-US" dirty="0" smtClean="0"/>
+              <a:t> </a:t>
+            </a:r>
+            <a:r>
+              <a:rPr lang="en-US" dirty="0" err="1" smtClean="0"/>
+              <a:t>để</a:t>
+            </a:r>
+            <a:r>
+              <a:rPr lang="en-US" dirty="0" smtClean="0"/>
+              <a:t> </a:t>
+            </a:r>
+            <a:r>
+              <a:rPr lang="en-US" dirty="0" err="1" smtClean="0"/>
+              <a:t>biến</a:t>
+            </a:r>
+            <a:r>
+              <a:rPr lang="en-US" dirty="0" smtClean="0"/>
+              <a:t> </a:t>
+            </a:r>
+            <a:r>
+              <a:rPr lang="en-US" dirty="0" err="1" smtClean="0"/>
+              <a:t>tính</a:t>
+            </a:r>
+            <a:r>
+              <a:rPr lang="en-US" dirty="0" smtClean="0"/>
+              <a:t> </a:t>
+            </a:r>
+            <a:r>
+              <a:rPr lang="en-US" dirty="0" err="1" smtClean="0"/>
+              <a:t>biểu</a:t>
+            </a:r>
+            <a:r>
+              <a:rPr lang="en-US" dirty="0" smtClean="0"/>
+              <a:t> </a:t>
+            </a:r>
+            <a:r>
+              <a:rPr lang="en-US" dirty="0" err="1" smtClean="0"/>
+              <a:t>thức</a:t>
+            </a:r>
+            <a:r>
+              <a:rPr lang="en-US" dirty="0" smtClean="0"/>
+              <a:t> </a:t>
+            </a:r>
+            <a:r>
+              <a:rPr lang="en-US" dirty="0" err="1" smtClean="0"/>
+              <a:t>dó</a:t>
+            </a:r>
+            <a:r>
+              <a:rPr lang="en-US" dirty="0" smtClean="0"/>
+              <a:t> </a:t>
+            </a:r>
+            <a:r>
+              <a:rPr lang="en-US" dirty="0" err="1" smtClean="0"/>
+              <a:t>được</a:t>
+            </a:r>
+            <a:r>
+              <a:rPr lang="en-US" dirty="0" smtClean="0"/>
+              <a:t> </a:t>
+            </a:r>
+            <a:r>
+              <a:rPr lang="en-US" dirty="0" err="1" smtClean="0"/>
+              <a:t>cấp</a:t>
+            </a:r>
+            <a:r>
+              <a:rPr lang="en-US" dirty="0" smtClean="0"/>
+              <a:t> </a:t>
+            </a:r>
+            <a:r>
+              <a:rPr lang="en-US" dirty="0" err="1" smtClean="0"/>
+              <a:t>bộ</a:t>
+            </a:r>
+            <a:r>
+              <a:rPr lang="en-US" dirty="0" smtClean="0"/>
+              <a:t> </a:t>
+            </a:r>
+            <a:r>
+              <a:rPr lang="en-US" dirty="0" err="1" smtClean="0"/>
+              <a:t>nhớ</a:t>
+            </a:r>
+            <a:r>
+              <a:rPr lang="en-US" dirty="0" smtClean="0"/>
+              <a:t> </a:t>
+            </a:r>
+            <a:r>
+              <a:rPr lang="en-US" dirty="0" err="1" smtClean="0"/>
+              <a:t>là</a:t>
+            </a:r>
+            <a:r>
+              <a:rPr lang="en-US" dirty="0" smtClean="0"/>
+              <a:t> long </a:t>
+            </a:r>
+            <a:r>
+              <a:rPr lang="en-US" dirty="0" err="1" smtClean="0"/>
+              <a:t>long</a:t>
+            </a:r>
+            <a:endParaRPr lang="en-US" dirty="0" smtClean="0"/>
+          </a:p>
+          <a:p>
+            <a:endParaRPr lang="en-US" dirty="0"/>
+          </a:p>
+          <a:p>
+            <a:r>
+              <a:rPr lang="en-US" dirty="0" err="1" smtClean="0"/>
+              <a:t>Vòng</a:t>
+            </a:r>
+            <a:r>
+              <a:rPr lang="en-US" dirty="0" smtClean="0"/>
+              <a:t> </a:t>
+            </a:r>
+            <a:r>
+              <a:rPr lang="en-US" dirty="0" err="1" smtClean="0"/>
+              <a:t>lặp</a:t>
+            </a:r>
+            <a:r>
+              <a:rPr lang="en-US" dirty="0" smtClean="0"/>
+              <a:t> </a:t>
+            </a:r>
+            <a:r>
+              <a:rPr lang="en-US" dirty="0" err="1" smtClean="0"/>
+              <a:t>không</a:t>
+            </a:r>
+            <a:r>
+              <a:rPr lang="en-US" dirty="0" smtClean="0"/>
+              <a:t> </a:t>
+            </a:r>
+            <a:r>
+              <a:rPr lang="en-US" dirty="0" err="1" smtClean="0"/>
+              <a:t>hề</a:t>
+            </a:r>
+            <a:r>
+              <a:rPr lang="en-US" dirty="0" smtClean="0"/>
+              <a:t> </a:t>
+            </a:r>
+            <a:r>
+              <a:rPr lang="en-US" dirty="0" err="1" smtClean="0"/>
+              <a:t>được</a:t>
+            </a:r>
+            <a:r>
+              <a:rPr lang="en-US" dirty="0" smtClean="0"/>
+              <a:t> </a:t>
+            </a:r>
+            <a:r>
+              <a:rPr lang="en-US" dirty="0" err="1" smtClean="0"/>
+              <a:t>sử</a:t>
+            </a:r>
+            <a:r>
+              <a:rPr lang="en-US" dirty="0" smtClean="0"/>
+              <a:t> </a:t>
+            </a:r>
+            <a:r>
+              <a:rPr lang="en-US" dirty="0" err="1" smtClean="0"/>
+              <a:t>dụng</a:t>
+            </a:r>
+            <a:r>
+              <a:rPr lang="en-US" dirty="0" smtClean="0"/>
+              <a:t> </a:t>
+            </a:r>
+            <a:r>
+              <a:rPr lang="en-US" dirty="0" err="1" smtClean="0"/>
+              <a:t>trong</a:t>
+            </a:r>
+            <a:r>
+              <a:rPr lang="en-US" dirty="0" smtClean="0"/>
+              <a:t> </a:t>
+            </a:r>
+            <a:r>
+              <a:rPr lang="en-US" dirty="0" err="1" smtClean="0"/>
+              <a:t>chương</a:t>
+            </a:r>
+            <a:r>
+              <a:rPr lang="en-US" dirty="0" smtClean="0"/>
+              <a:t> </a:t>
+            </a:r>
+            <a:r>
+              <a:rPr lang="en-US" dirty="0" err="1" smtClean="0"/>
+              <a:t>trình</a:t>
+            </a:r>
+            <a:r>
+              <a:rPr lang="en-US" dirty="0" smtClean="0"/>
+              <a:t> </a:t>
+            </a:r>
+            <a:r>
+              <a:rPr lang="en-US" dirty="0" err="1" smtClean="0"/>
+              <a:t>lần</a:t>
+            </a:r>
+            <a:r>
+              <a:rPr lang="en-US" dirty="0" smtClean="0"/>
+              <a:t> </a:t>
+            </a:r>
+            <a:r>
+              <a:rPr lang="en-US" dirty="0" err="1" smtClean="0"/>
+              <a:t>này</a:t>
+            </a:r>
+            <a:r>
+              <a:rPr lang="en-US" dirty="0"/>
+              <a:t> </a:t>
+            </a:r>
+            <a:r>
+              <a:rPr lang="en-US" dirty="0" err="1" smtClean="0"/>
+              <a:t>mà</a:t>
+            </a:r>
+            <a:r>
+              <a:rPr lang="en-US" dirty="0" smtClean="0"/>
+              <a:t> </a:t>
+            </a:r>
+            <a:r>
+              <a:rPr lang="en-US" dirty="0" err="1" smtClean="0"/>
+              <a:t>chỉ</a:t>
+            </a:r>
+            <a:r>
+              <a:rPr lang="en-US" dirty="0" smtClean="0"/>
+              <a:t> </a:t>
+            </a:r>
+            <a:r>
+              <a:rPr lang="en-US" dirty="0" err="1" smtClean="0"/>
+              <a:t>đơn</a:t>
+            </a:r>
+            <a:r>
+              <a:rPr lang="en-US" dirty="0" smtClean="0"/>
+              <a:t> </a:t>
+            </a:r>
+            <a:r>
+              <a:rPr lang="en-US" dirty="0" err="1" smtClean="0"/>
+              <a:t>thuần</a:t>
+            </a:r>
+            <a:r>
+              <a:rPr lang="en-US" dirty="0" smtClean="0"/>
+              <a:t> </a:t>
+            </a:r>
+            <a:r>
+              <a:rPr lang="en-US" dirty="0" err="1" smtClean="0"/>
+              <a:t>là</a:t>
+            </a:r>
+            <a:r>
+              <a:rPr lang="en-US" dirty="0" smtClean="0"/>
+              <a:t> </a:t>
+            </a:r>
+            <a:r>
+              <a:rPr lang="en-US" dirty="0" err="1" smtClean="0"/>
+              <a:t>biểu</a:t>
+            </a:r>
+            <a:r>
+              <a:rPr lang="en-US" dirty="0" smtClean="0"/>
+              <a:t> </a:t>
+            </a:r>
+            <a:r>
+              <a:rPr lang="en-US" dirty="0" err="1" smtClean="0"/>
+              <a:t>thức</a:t>
+            </a:r>
+            <a:r>
+              <a:rPr lang="en-US" dirty="0" smtClean="0"/>
+              <a:t> </a:t>
+            </a:r>
+            <a:r>
+              <a:rPr lang="en-US" dirty="0" err="1" smtClean="0"/>
+              <a:t>toán</a:t>
+            </a:r>
+            <a:r>
+              <a:rPr lang="en-US" dirty="0" smtClean="0"/>
+              <a:t> </a:t>
+            </a:r>
+            <a:r>
+              <a:rPr lang="en-US" dirty="0" err="1" smtClean="0"/>
+              <a:t>học</a:t>
+            </a:r>
+            <a:r>
+              <a:rPr lang="en-US" dirty="0" smtClean="0"/>
+              <a:t> </a:t>
+            </a:r>
+            <a:r>
+              <a:rPr lang="en-US" dirty="0" err="1" smtClean="0"/>
+              <a:t>nên</a:t>
+            </a:r>
+            <a:r>
+              <a:rPr lang="en-US" dirty="0" smtClean="0"/>
+              <a:t> </a:t>
+            </a:r>
+            <a:r>
+              <a:rPr lang="en-US" dirty="0" err="1" smtClean="0"/>
+              <a:t>chương</a:t>
+            </a:r>
+            <a:r>
+              <a:rPr lang="en-US" dirty="0" smtClean="0"/>
+              <a:t> </a:t>
+            </a:r>
+            <a:r>
+              <a:rPr lang="en-US" dirty="0" err="1" smtClean="0"/>
+              <a:t>trình</a:t>
+            </a:r>
+            <a:r>
+              <a:rPr lang="en-US" dirty="0" smtClean="0"/>
+              <a:t> </a:t>
+            </a:r>
+            <a:r>
+              <a:rPr lang="en-US" dirty="0" err="1" smtClean="0"/>
+              <a:t>sẽ</a:t>
+            </a:r>
+            <a:r>
+              <a:rPr lang="en-US" dirty="0" smtClean="0"/>
+              <a:t> </a:t>
+            </a:r>
+            <a:r>
+              <a:rPr lang="en-US" dirty="0" err="1" smtClean="0"/>
+              <a:t>chạy</a:t>
+            </a:r>
+            <a:r>
+              <a:rPr lang="en-US" dirty="0" smtClean="0"/>
+              <a:t> </a:t>
+            </a:r>
+            <a:r>
+              <a:rPr lang="en-US" dirty="0" err="1" smtClean="0"/>
+              <a:t>rất</a:t>
+            </a:r>
+            <a:r>
+              <a:rPr lang="en-US" dirty="0" smtClean="0"/>
+              <a:t> </a:t>
+            </a:r>
+            <a:r>
+              <a:rPr lang="en-US" dirty="0" err="1" smtClean="0"/>
+              <a:t>nhanh</a:t>
+            </a:r>
+            <a:endParaRPr lang="en-US" dirty="0" smtClean="0"/>
+          </a:p>
+          <a:p>
+            <a:endParaRPr lang="en-US" dirty="0"/>
+          </a:p>
+        </p:txBody>
+      </p:sp>
+    </p:spTree>
+    <p:extLst>
+      <p:ext uri="{BB962C8B-B14F-4D97-AF65-F5344CB8AC3E}">
+        <p14:creationId xmlns:p14="http://schemas.microsoft.com/office/powerpoint/2010/main" val="485132195"/>
+      </p:ext>
+    </p:extLst>
+  </p:cSld>
+  <p:clrMapOvr>
+    <a:masterClrMapping/>
+  </p:clrMapOvr>
+  <p:transition spd="slow">
+    <p:push dir="u"/>
+  </p:transition>
   <p:timing>
     <p:tnLst>
       <p:par>
@@ -4106,13 +4676,13 @@
   <p:clrMapOvr>
     <a:masterClrMapping/>
   </p:clrMapOvr>
-  <mc:AlternateContent xmlns:mc="http://schemas.openxmlformats.org/markup-compatibility/2006">
-    <mc:Choice xmlns:p14="http://schemas.microsoft.com/office/powerpoint/2010/main" Requires="p14">
+  <mc:AlternateContent xmlns:mc="http://schemas.openxmlformats.org/markup-compatibility/2006" xmlns:p14="http://schemas.microsoft.com/office/powerpoint/2010/main">
+    <mc:Choice Requires="p14">
       <p:transition p14:dur="100">
         <p:cut/>
       </p:transition>
     </mc:Choice>
-    <mc:Fallback>
+    <mc:Fallback xmlns="">
       <p:transition>
         <p:cut/>
       </p:transition>
@@ -4499,13 +5069,13 @@
   <p:clrMapOvr>
     <a:masterClrMapping/>
   </p:clrMapOvr>
-  <mc:AlternateContent xmlns:mc="http://schemas.openxmlformats.org/markup-compatibility/2006">
-    <mc:Choice xmlns:p14="http://schemas.microsoft.com/office/powerpoint/2010/main" Requires="p14">
+  <mc:AlternateContent xmlns:mc="http://schemas.openxmlformats.org/markup-compatibility/2006" xmlns:p14="http://schemas.microsoft.com/office/powerpoint/2010/main">
+    <mc:Choice Requires="p14">
       <p:transition spd="slow" p14:dur="1500">
         <p:split orient="vert"/>
       </p:transition>
     </mc:Choice>
-    <mc:Fallback>
+    <mc:Fallback xmlns="">
       <p:transition spd="slow">
         <p:split orient="vert"/>
       </p:transition>
@@ -5418,13 +5988,13 @@
   <p:clrMapOvr>
     <a:masterClrMapping/>
   </p:clrMapOvr>
-  <mc:AlternateContent xmlns:mc="http://schemas.openxmlformats.org/markup-compatibility/2006">
-    <mc:Choice xmlns:p14="http://schemas.microsoft.com/office/powerpoint/2010/main" Requires="p14">
+  <mc:AlternateContent xmlns:mc="http://schemas.openxmlformats.org/markup-compatibility/2006" xmlns:p14="http://schemas.microsoft.com/office/powerpoint/2010/main">
+    <mc:Choice Requires="p14">
       <p:transition spd="slow" p14:dur="800">
         <p:circle/>
       </p:transition>
     </mc:Choice>
-    <mc:Fallback>
+    <mc:Fallback xmlns="">
       <p:transition spd="slow">
         <p:circle/>
       </p:transition>
@@ -6427,6 +6997,705 @@
   </p:clrMapOvr>
   <p:transition spd="slow">
     <p:push dir="u"/>
+  </p:transition>
+  <p:timing>
+    <p:tnLst>
+      <p:par>
+        <p:cTn id="1" dur="indefinite" restart="never" nodeType="tmRoot"/>
+      </p:par>
+    </p:tnLst>
+  </p:timing>
+</p:sld>
+</file>
+
+<file path=ppt/slides/slide9.xml><?xml version="1.0" encoding="utf-8"?>
+<p:sld xmlns:a="http://schemas.openxmlformats.org/drawingml/2006/main" xmlns:r="http://schemas.openxmlformats.org/officeDocument/2006/relationships" xmlns:p="http://schemas.openxmlformats.org/presentationml/2006/main">
+  <p:cSld>
+    <p:spTree>
+      <p:nvGrpSpPr>
+        <p:cNvPr id="1" name=""/>
+        <p:cNvGrpSpPr/>
+        <p:nvPr/>
+      </p:nvGrpSpPr>
+      <p:grpSpPr>
+        <a:xfrm>
+          <a:off x="0" y="0"/>
+          <a:ext cx="0" cy="0"/>
+          <a:chOff x="0" y="0"/>
+          <a:chExt cx="0" cy="0"/>
+        </a:xfrm>
+      </p:grpSpPr>
+      <p:sp>
+        <p:nvSpPr>
+          <p:cNvPr id="4" name="TextBox 3"/>
+          <p:cNvSpPr txBox="1"/>
+          <p:nvPr/>
+        </p:nvSpPr>
+        <p:spPr>
+          <a:xfrm>
+            <a:off x="1105989" y="784458"/>
+            <a:ext cx="6934200" cy="461665"/>
+          </a:xfrm>
+          <a:prstGeom prst="rect">
+            <a:avLst/>
+          </a:prstGeom>
+          <a:noFill/>
+        </p:spPr>
+        <p:txBody>
+          <a:bodyPr wrap="square" rtlCol="0">
+            <a:spAutoFit/>
+          </a:bodyPr>
+          <a:lstStyle/>
+          <a:p>
+            <a:r>
+              <a:rPr lang="en-US" sz="2400" dirty="0" smtClean="0"/>
+              <a:t>VD: </a:t>
+            </a:r>
+            <a:r>
+              <a:rPr lang="en-US" sz="2400" dirty="0" err="1" smtClean="0"/>
+              <a:t>Tính</a:t>
+            </a:r>
+            <a:r>
+              <a:rPr lang="en-US" sz="2400" dirty="0" smtClean="0"/>
+              <a:t> </a:t>
+            </a:r>
+            <a:r>
+              <a:rPr lang="en-US" sz="2400" dirty="0" err="1" smtClean="0"/>
+              <a:t>tổng</a:t>
+            </a:r>
+            <a:r>
+              <a:rPr lang="en-US" sz="2400" dirty="0" smtClean="0"/>
+              <a:t> </a:t>
+            </a:r>
+            <a:r>
+              <a:rPr lang="en-US" sz="2400" dirty="0" err="1" smtClean="0"/>
+              <a:t>các</a:t>
+            </a:r>
+            <a:r>
+              <a:rPr lang="en-US" sz="2400" dirty="0" smtClean="0"/>
+              <a:t> </a:t>
+            </a:r>
+            <a:r>
+              <a:rPr lang="en-US" sz="2400" dirty="0" err="1" smtClean="0"/>
+              <a:t>số</a:t>
+            </a:r>
+            <a:r>
+              <a:rPr lang="en-US" sz="2400" dirty="0" smtClean="0"/>
+              <a:t> </a:t>
+            </a:r>
+            <a:r>
+              <a:rPr lang="en-US" sz="2400" dirty="0" err="1" smtClean="0"/>
+              <a:t>từ</a:t>
+            </a:r>
+            <a:r>
+              <a:rPr lang="en-US" sz="2400" dirty="0" smtClean="0"/>
+              <a:t> 1 </a:t>
+            </a:r>
+            <a:r>
+              <a:rPr lang="en-US" sz="2400" dirty="0" err="1" smtClean="0"/>
+              <a:t>tới</a:t>
+            </a:r>
+            <a:r>
+              <a:rPr lang="en-US" sz="2400" dirty="0" smtClean="0"/>
+              <a:t> n</a:t>
+            </a:r>
+            <a:endParaRPr lang="en-US" sz="2400" dirty="0"/>
+          </a:p>
+        </p:txBody>
+      </p:sp>
+      <p:sp>
+        <p:nvSpPr>
+          <p:cNvPr id="5" name="TextBox 4"/>
+          <p:cNvSpPr txBox="1"/>
+          <p:nvPr/>
+        </p:nvSpPr>
+        <p:spPr>
+          <a:xfrm>
+            <a:off x="1143000" y="1600200"/>
+            <a:ext cx="7239000" cy="1938992"/>
+          </a:xfrm>
+          <a:prstGeom prst="rect">
+            <a:avLst/>
+          </a:prstGeom>
+          <a:noFill/>
+        </p:spPr>
+        <p:txBody>
+          <a:bodyPr wrap="square" rtlCol="0">
+            <a:spAutoFit/>
+          </a:bodyPr>
+          <a:lstStyle/>
+          <a:p>
+            <a:r>
+              <a:rPr lang="en-US" sz="2000" dirty="0" smtClean="0">
+                <a:solidFill>
+                  <a:srgbClr val="FF0000"/>
+                </a:solidFill>
+              </a:rPr>
+              <a:t>long </a:t>
+            </a:r>
+            <a:r>
+              <a:rPr lang="en-US" sz="2000" dirty="0" err="1" smtClean="0">
+                <a:solidFill>
+                  <a:srgbClr val="FF0000"/>
+                </a:solidFill>
+              </a:rPr>
+              <a:t>long</a:t>
+            </a:r>
+            <a:r>
+              <a:rPr lang="en-US" sz="2000" dirty="0" smtClean="0">
+                <a:solidFill>
+                  <a:srgbClr val="FF0000"/>
+                </a:solidFill>
+              </a:rPr>
+              <a:t> </a:t>
+            </a:r>
+            <a:r>
+              <a:rPr lang="en-US" sz="2000" dirty="0" smtClean="0"/>
+              <a:t>Sum(</a:t>
+            </a:r>
+            <a:r>
+              <a:rPr lang="en-US" sz="2000" dirty="0" err="1" smtClean="0"/>
+              <a:t>int</a:t>
+            </a:r>
+            <a:r>
+              <a:rPr lang="en-US" sz="2000" dirty="0" smtClean="0"/>
+              <a:t> n){</a:t>
+            </a:r>
+          </a:p>
+          <a:p>
+            <a:r>
+              <a:rPr lang="en-US" sz="2000" dirty="0"/>
+              <a:t>	</a:t>
+            </a:r>
+            <a:r>
+              <a:rPr lang="en-US" sz="2000" dirty="0" smtClean="0">
+                <a:solidFill>
+                  <a:srgbClr val="FF0000"/>
+                </a:solidFill>
+              </a:rPr>
+              <a:t>long </a:t>
+            </a:r>
+            <a:r>
+              <a:rPr lang="en-US" sz="2000" dirty="0" err="1" smtClean="0">
+                <a:solidFill>
+                  <a:srgbClr val="FF0000"/>
+                </a:solidFill>
+              </a:rPr>
+              <a:t>long</a:t>
+            </a:r>
+            <a:r>
+              <a:rPr lang="en-US" sz="2000" dirty="0" smtClean="0">
+                <a:solidFill>
+                  <a:srgbClr val="FF0000"/>
+                </a:solidFill>
+              </a:rPr>
+              <a:t> </a:t>
+            </a:r>
+            <a:r>
+              <a:rPr lang="en-US" sz="2000" dirty="0" smtClean="0"/>
+              <a:t>res = 0;</a:t>
+            </a:r>
+            <a:endParaRPr lang="en-US" sz="2000" dirty="0" smtClean="0"/>
+          </a:p>
+          <a:p>
+            <a:r>
+              <a:rPr lang="en-US" sz="2000" dirty="0"/>
+              <a:t>	</a:t>
+            </a:r>
+            <a:r>
+              <a:rPr lang="en-US" sz="2000" dirty="0" smtClean="0"/>
+              <a:t>for(</a:t>
+            </a:r>
+            <a:r>
+              <a:rPr lang="en-US" sz="2000" dirty="0" err="1" smtClean="0"/>
+              <a:t>int</a:t>
+            </a:r>
+            <a:r>
+              <a:rPr lang="en-US" sz="2000" dirty="0" smtClean="0"/>
+              <a:t> </a:t>
+            </a:r>
+            <a:r>
+              <a:rPr lang="en-US" sz="2000" dirty="0" err="1" smtClean="0"/>
+              <a:t>i</a:t>
+            </a:r>
+            <a:r>
+              <a:rPr lang="en-US" sz="2000" dirty="0" smtClean="0"/>
+              <a:t>=1;i</a:t>
+            </a:r>
+            <a:r>
+              <a:rPr lang="en-US" sz="2000" dirty="0" smtClean="0"/>
+              <a:t>&lt;=</a:t>
+            </a:r>
+            <a:r>
+              <a:rPr lang="en-US" sz="2000" dirty="0" err="1" smtClean="0">
+                <a:solidFill>
+                  <a:srgbClr val="FF0000"/>
+                </a:solidFill>
+              </a:rPr>
+              <a:t>n</a:t>
+            </a:r>
+            <a:r>
+              <a:rPr lang="en-US" sz="2000" dirty="0" err="1" smtClean="0"/>
+              <a:t>;i</a:t>
+            </a:r>
+            <a:r>
+              <a:rPr lang="en-US" sz="2000" dirty="0" smtClean="0"/>
+              <a:t>++)</a:t>
+            </a:r>
+          </a:p>
+          <a:p>
+            <a:r>
+              <a:rPr lang="en-US" sz="2000" dirty="0" smtClean="0"/>
+              <a:t>                </a:t>
+            </a:r>
+            <a:r>
+              <a:rPr lang="en-US" sz="2000" dirty="0" smtClean="0"/>
+              <a:t>	 res += </a:t>
+            </a:r>
+            <a:r>
+              <a:rPr lang="en-US" sz="2000" dirty="0" err="1" smtClean="0"/>
+              <a:t>i</a:t>
+            </a:r>
+            <a:r>
+              <a:rPr lang="en-US" sz="2000" dirty="0" smtClean="0"/>
+              <a:t>;</a:t>
+            </a:r>
+            <a:endParaRPr lang="en-US" sz="2000" dirty="0" smtClean="0"/>
+          </a:p>
+          <a:p>
+            <a:r>
+              <a:rPr lang="en-US" sz="2000" dirty="0" smtClean="0"/>
+              <a:t>                 </a:t>
+            </a:r>
+            <a:r>
+              <a:rPr lang="en-US" sz="2000" dirty="0" smtClean="0"/>
+              <a:t>return </a:t>
+            </a:r>
+            <a:r>
+              <a:rPr lang="en-US" sz="2000" dirty="0" smtClean="0"/>
+              <a:t>res</a:t>
+            </a:r>
+            <a:r>
+              <a:rPr lang="en-US" sz="2000" dirty="0" smtClean="0"/>
+              <a:t>;</a:t>
+            </a:r>
+          </a:p>
+          <a:p>
+            <a:r>
+              <a:rPr lang="en-US" sz="2000" dirty="0" smtClean="0"/>
+              <a:t>}</a:t>
+            </a:r>
+            <a:endParaRPr lang="en-US" sz="2000" dirty="0"/>
+          </a:p>
+        </p:txBody>
+      </p:sp>
+      <p:sp>
+        <p:nvSpPr>
+          <p:cNvPr id="6" name="TextBox 5"/>
+          <p:cNvSpPr txBox="1"/>
+          <p:nvPr/>
+        </p:nvSpPr>
+        <p:spPr>
+          <a:xfrm>
+            <a:off x="914400" y="4401234"/>
+            <a:ext cx="7391400" cy="1631216"/>
+          </a:xfrm>
+          <a:prstGeom prst="rect">
+            <a:avLst/>
+          </a:prstGeom>
+          <a:noFill/>
+        </p:spPr>
+        <p:txBody>
+          <a:bodyPr wrap="square" rtlCol="0">
+            <a:spAutoFit/>
+          </a:bodyPr>
+          <a:lstStyle/>
+          <a:p>
+            <a:r>
+              <a:rPr lang="en-US" sz="2000" dirty="0" err="1" smtClean="0"/>
+              <a:t>Vòng</a:t>
+            </a:r>
+            <a:r>
+              <a:rPr lang="en-US" sz="2000" dirty="0" smtClean="0"/>
+              <a:t> </a:t>
+            </a:r>
+            <a:r>
+              <a:rPr lang="en-US" sz="2000" dirty="0" err="1" smtClean="0"/>
+              <a:t>lặp</a:t>
+            </a:r>
+            <a:r>
+              <a:rPr lang="en-US" sz="2000" dirty="0" smtClean="0"/>
+              <a:t> </a:t>
+            </a:r>
+            <a:r>
+              <a:rPr lang="en-US" sz="2000" dirty="0" err="1" smtClean="0"/>
+              <a:t>trên</a:t>
+            </a:r>
+            <a:r>
+              <a:rPr lang="en-US" sz="2000" dirty="0" smtClean="0"/>
+              <a:t> </a:t>
+            </a:r>
+            <a:r>
+              <a:rPr lang="en-US" sz="2000" dirty="0" err="1" smtClean="0"/>
+              <a:t>sẽ</a:t>
+            </a:r>
+            <a:r>
+              <a:rPr lang="en-US" sz="2000" dirty="0" smtClean="0"/>
+              <a:t> </a:t>
+            </a:r>
+            <a:r>
+              <a:rPr lang="en-US" sz="2000" dirty="0" err="1" smtClean="0"/>
+              <a:t>lặp</a:t>
+            </a:r>
+            <a:r>
+              <a:rPr lang="en-US" sz="2000" dirty="0" smtClean="0"/>
+              <a:t> n </a:t>
+            </a:r>
+            <a:r>
+              <a:rPr lang="en-US" sz="2000" dirty="0" err="1" smtClean="0"/>
+              <a:t>lần</a:t>
+            </a:r>
+            <a:r>
+              <a:rPr lang="en-US" sz="2000" dirty="0" smtClean="0"/>
+              <a:t> </a:t>
+            </a:r>
+            <a:r>
+              <a:rPr lang="en-US" sz="2000" dirty="0" err="1" smtClean="0"/>
+              <a:t>mới</a:t>
+            </a:r>
+            <a:r>
+              <a:rPr lang="en-US" sz="2000" dirty="0" smtClean="0"/>
+              <a:t> </a:t>
+            </a:r>
+            <a:r>
+              <a:rPr lang="en-US" sz="2000" dirty="0" err="1" smtClean="0"/>
+              <a:t>cho</a:t>
+            </a:r>
+            <a:r>
+              <a:rPr lang="en-US" sz="2000" dirty="0" smtClean="0"/>
+              <a:t> </a:t>
+            </a:r>
+            <a:r>
+              <a:rPr lang="en-US" sz="2000" dirty="0" err="1" smtClean="0"/>
+              <a:t>ra</a:t>
+            </a:r>
+            <a:r>
+              <a:rPr lang="en-US" sz="2000" dirty="0" smtClean="0"/>
+              <a:t> </a:t>
+            </a:r>
+            <a:r>
+              <a:rPr lang="en-US" sz="2000" dirty="0" err="1" smtClean="0"/>
+              <a:t>được</a:t>
+            </a:r>
+            <a:r>
+              <a:rPr lang="en-US" sz="2000" dirty="0" smtClean="0"/>
+              <a:t> </a:t>
+            </a:r>
+            <a:r>
+              <a:rPr lang="en-US" sz="2000" dirty="0" err="1" smtClean="0"/>
+              <a:t>kết</a:t>
+            </a:r>
+            <a:r>
+              <a:rPr lang="en-US" sz="2000" dirty="0" smtClean="0"/>
+              <a:t> </a:t>
+            </a:r>
+            <a:r>
+              <a:rPr lang="en-US" sz="2000" dirty="0" err="1" smtClean="0"/>
+              <a:t>quả</a:t>
+            </a:r>
+            <a:r>
+              <a:rPr lang="en-US" sz="2000" dirty="0" smtClean="0"/>
+              <a:t>. </a:t>
+            </a:r>
+            <a:br>
+              <a:rPr lang="en-US" sz="2000" dirty="0" smtClean="0"/>
+            </a:br>
+            <a:r>
+              <a:rPr lang="en-US" sz="2000" dirty="0" err="1" smtClean="0"/>
+              <a:t>Tức</a:t>
+            </a:r>
+            <a:r>
+              <a:rPr lang="en-US" sz="2000" dirty="0" smtClean="0"/>
+              <a:t> </a:t>
+            </a:r>
+            <a:r>
+              <a:rPr lang="en-US" sz="2000" dirty="0" err="1" smtClean="0"/>
+              <a:t>là</a:t>
+            </a:r>
+            <a:r>
+              <a:rPr lang="en-US" sz="2000" dirty="0" smtClean="0"/>
+              <a:t> </a:t>
+            </a:r>
+            <a:r>
+              <a:rPr lang="en-US" sz="2000" dirty="0" err="1" smtClean="0"/>
+              <a:t>với</a:t>
+            </a:r>
+            <a:r>
+              <a:rPr lang="en-US" sz="2000" dirty="0" smtClean="0"/>
+              <a:t> n = 10^8 </a:t>
+            </a:r>
+            <a:r>
+              <a:rPr lang="en-US" sz="2000" dirty="0" err="1" smtClean="0"/>
+              <a:t>thì</a:t>
+            </a:r>
+            <a:r>
+              <a:rPr lang="en-US" sz="2000" dirty="0" smtClean="0"/>
+              <a:t> </a:t>
+            </a:r>
+            <a:r>
+              <a:rPr lang="en-US" sz="2000" dirty="0" err="1" smtClean="0"/>
+              <a:t>vòng</a:t>
+            </a:r>
+            <a:r>
+              <a:rPr lang="en-US" sz="2000" dirty="0" smtClean="0"/>
+              <a:t> for </a:t>
+            </a:r>
+            <a:r>
+              <a:rPr lang="en-US" sz="2000" dirty="0" err="1" smtClean="0"/>
+              <a:t>sẽ</a:t>
+            </a:r>
+            <a:r>
+              <a:rPr lang="en-US" sz="2000" dirty="0" smtClean="0"/>
+              <a:t> </a:t>
+            </a:r>
+            <a:r>
+              <a:rPr lang="en-US" sz="2000" dirty="0" err="1" smtClean="0"/>
+              <a:t>lặp</a:t>
+            </a:r>
+            <a:r>
+              <a:rPr lang="en-US" sz="2000" dirty="0" smtClean="0"/>
+              <a:t> 10^8 </a:t>
+            </a:r>
+            <a:r>
+              <a:rPr lang="en-US" sz="2000" dirty="0" err="1" smtClean="0"/>
+              <a:t>lần</a:t>
+            </a:r>
+            <a:endParaRPr lang="en-US" sz="2000" dirty="0" smtClean="0"/>
+          </a:p>
+          <a:p>
+            <a:endParaRPr lang="en-US" sz="2000" dirty="0"/>
+          </a:p>
+          <a:p>
+            <a:r>
+              <a:rPr lang="en-US" sz="2000" dirty="0" err="1" smtClean="0"/>
+              <a:t>Hơn</a:t>
+            </a:r>
+            <a:r>
+              <a:rPr lang="en-US" sz="2000" dirty="0" smtClean="0"/>
+              <a:t> </a:t>
+            </a:r>
+            <a:r>
+              <a:rPr lang="en-US" sz="2000" dirty="0" err="1" smtClean="0"/>
+              <a:t>thế</a:t>
+            </a:r>
+            <a:r>
+              <a:rPr lang="en-US" sz="2000" dirty="0" smtClean="0"/>
+              <a:t> </a:t>
+            </a:r>
+            <a:r>
+              <a:rPr lang="en-US" sz="2000" dirty="0" err="1" smtClean="0"/>
+              <a:t>nữa</a:t>
+            </a:r>
+            <a:r>
+              <a:rPr lang="en-US" sz="2000" dirty="0" smtClean="0"/>
+              <a:t>, </a:t>
+            </a:r>
+            <a:r>
+              <a:rPr lang="en-US" sz="2000" dirty="0" err="1" smtClean="0"/>
+              <a:t>kết</a:t>
+            </a:r>
+            <a:r>
+              <a:rPr lang="en-US" sz="2000" dirty="0" smtClean="0"/>
+              <a:t> </a:t>
+            </a:r>
+            <a:r>
+              <a:rPr lang="en-US" sz="2000" dirty="0" err="1" smtClean="0"/>
+              <a:t>quả</a:t>
+            </a:r>
+            <a:r>
+              <a:rPr lang="en-US" sz="2000" dirty="0" smtClean="0"/>
+              <a:t> </a:t>
+            </a:r>
+            <a:r>
+              <a:rPr lang="en-US" sz="2000" dirty="0" err="1" smtClean="0"/>
+              <a:t>sẽ</a:t>
+            </a:r>
+            <a:r>
+              <a:rPr lang="en-US" sz="2000" dirty="0" smtClean="0"/>
+              <a:t> </a:t>
+            </a:r>
+            <a:r>
+              <a:rPr lang="en-US" sz="2000" dirty="0" err="1" smtClean="0"/>
+              <a:t>bị</a:t>
+            </a:r>
+            <a:r>
+              <a:rPr lang="en-US" sz="2000" dirty="0" smtClean="0"/>
+              <a:t> </a:t>
+            </a:r>
+            <a:r>
+              <a:rPr lang="en-US" sz="2000" dirty="0" err="1" smtClean="0"/>
+              <a:t>tràn</a:t>
+            </a:r>
+            <a:r>
+              <a:rPr lang="en-US" sz="2000" dirty="0" smtClean="0"/>
+              <a:t> </a:t>
+            </a:r>
+            <a:r>
+              <a:rPr lang="en-US" sz="2000" dirty="0" err="1" smtClean="0"/>
+              <a:t>nếu</a:t>
+            </a:r>
+            <a:r>
+              <a:rPr lang="en-US" sz="2000" dirty="0" smtClean="0"/>
+              <a:t> ở </a:t>
+            </a:r>
+            <a:r>
+              <a:rPr lang="en-US" sz="2000" dirty="0" err="1" smtClean="0"/>
+              <a:t>được</a:t>
+            </a:r>
+            <a:r>
+              <a:rPr lang="en-US" sz="2000" dirty="0" smtClean="0"/>
+              <a:t> </a:t>
+            </a:r>
+            <a:r>
+              <a:rPr lang="en-US" sz="2000" dirty="0" err="1" smtClean="0"/>
+              <a:t>lưu</a:t>
+            </a:r>
+            <a:r>
+              <a:rPr lang="en-US" sz="2000" dirty="0" smtClean="0"/>
+              <a:t> ở </a:t>
+            </a:r>
+            <a:r>
+              <a:rPr lang="en-US" sz="2000" dirty="0" err="1" smtClean="0"/>
+              <a:t>kiểu</a:t>
+            </a:r>
+            <a:r>
+              <a:rPr lang="en-US" sz="2000" dirty="0" smtClean="0"/>
+              <a:t> </a:t>
+            </a:r>
+            <a:r>
+              <a:rPr lang="en-US" sz="2000" dirty="0" err="1" smtClean="0"/>
+              <a:t>int</a:t>
+            </a:r>
+            <a:r>
+              <a:rPr lang="en-US" sz="2000" dirty="0" smtClean="0"/>
+              <a:t> </a:t>
+            </a:r>
+            <a:r>
+              <a:rPr lang="en-US" sz="2000" dirty="0" err="1" smtClean="0"/>
+              <a:t>nên</a:t>
+            </a:r>
+            <a:r>
+              <a:rPr lang="en-US" sz="2000" dirty="0" smtClean="0"/>
+              <a:t> ta </a:t>
+            </a:r>
+            <a:r>
+              <a:rPr lang="en-US" sz="2000" dirty="0" err="1" smtClean="0"/>
+              <a:t>sẽ</a:t>
+            </a:r>
+            <a:r>
+              <a:rPr lang="en-US" sz="2000" dirty="0" smtClean="0"/>
+              <a:t> </a:t>
+            </a:r>
+            <a:r>
+              <a:rPr lang="en-US" sz="2000" dirty="0" err="1" smtClean="0"/>
+              <a:t>phải</a:t>
+            </a:r>
+            <a:r>
+              <a:rPr lang="en-US" sz="2000" dirty="0" smtClean="0"/>
+              <a:t> </a:t>
+            </a:r>
+            <a:r>
+              <a:rPr lang="en-US" sz="2000" dirty="0" err="1" smtClean="0"/>
+              <a:t>sử</a:t>
+            </a:r>
+            <a:r>
+              <a:rPr lang="en-US" sz="2000" dirty="0" smtClean="0"/>
+              <a:t> </a:t>
+            </a:r>
+            <a:r>
+              <a:rPr lang="en-US" sz="2000" dirty="0" err="1" smtClean="0"/>
+              <a:t>dụng</a:t>
+            </a:r>
+            <a:r>
+              <a:rPr lang="en-US" sz="2000" dirty="0" smtClean="0"/>
+              <a:t> long </a:t>
+            </a:r>
+            <a:r>
+              <a:rPr lang="en-US" sz="2000" dirty="0" err="1" smtClean="0"/>
+              <a:t>long</a:t>
+            </a:r>
+            <a:r>
+              <a:rPr lang="en-US" sz="2000" dirty="0"/>
+              <a:t> </a:t>
+            </a:r>
+            <a:r>
+              <a:rPr lang="en-US" sz="2000" dirty="0" err="1" smtClean="0"/>
+              <a:t>mới</a:t>
+            </a:r>
+            <a:r>
+              <a:rPr lang="en-US" sz="2000" dirty="0" smtClean="0"/>
+              <a:t> </a:t>
+            </a:r>
+            <a:r>
+              <a:rPr lang="en-US" sz="2000" dirty="0" err="1" smtClean="0"/>
+              <a:t>có</a:t>
+            </a:r>
+            <a:r>
+              <a:rPr lang="en-US" sz="2000" dirty="0" smtClean="0"/>
+              <a:t> </a:t>
+            </a:r>
+            <a:r>
+              <a:rPr lang="en-US" sz="2000" dirty="0" err="1" smtClean="0"/>
+              <a:t>thể</a:t>
+            </a:r>
+            <a:r>
+              <a:rPr lang="en-US" sz="2000" dirty="0" smtClean="0"/>
+              <a:t> </a:t>
+            </a:r>
+            <a:r>
+              <a:rPr lang="en-US" sz="2000" dirty="0" err="1" smtClean="0"/>
+              <a:t>lưu</a:t>
+            </a:r>
+            <a:r>
+              <a:rPr lang="en-US" sz="2000" dirty="0" smtClean="0"/>
+              <a:t> </a:t>
+            </a:r>
+            <a:r>
+              <a:rPr lang="en-US" sz="2000" dirty="0" err="1" smtClean="0"/>
+              <a:t>được</a:t>
+            </a:r>
+            <a:r>
+              <a:rPr lang="en-US" sz="2000" dirty="0" smtClean="0"/>
+              <a:t> </a:t>
+            </a:r>
+            <a:r>
+              <a:rPr lang="en-US" sz="2000" dirty="0" err="1" smtClean="0"/>
+              <a:t>với</a:t>
+            </a:r>
+            <a:r>
+              <a:rPr lang="en-US" sz="2000" dirty="0" smtClean="0"/>
+              <a:t> n </a:t>
+            </a:r>
+            <a:r>
+              <a:rPr lang="en-US" sz="2000" dirty="0" err="1" smtClean="0"/>
+              <a:t>lớn</a:t>
+            </a:r>
+            <a:endParaRPr lang="en-US" sz="2000" dirty="0"/>
+          </a:p>
+        </p:txBody>
+      </p:sp>
+    </p:spTree>
+    <p:extLst>
+      <p:ext uri="{BB962C8B-B14F-4D97-AF65-F5344CB8AC3E}">
+        <p14:creationId xmlns:p14="http://schemas.microsoft.com/office/powerpoint/2010/main" val="132479489"/>
+      </p:ext>
+    </p:extLst>
+  </p:cSld>
+  <p:clrMapOvr>
+    <a:masterClrMapping/>
+  </p:clrMapOvr>
+  <p:transition spd="slow">
+    <p:pull/>
   </p:transition>
   <p:timing>
     <p:tnLst>

</xml_diff>